<commit_message>
updating presentation and interim pdf report
</commit_message>
<xml_diff>
--- a/Progress Reports CIFRE & Workplans/PhD Interim Report/presentation/Self-Service Data Provisioning through Semantic Enrichment of Data.pptx
+++ b/Progress Reports CIFRE & Workplans/PhD Interim Report/presentation/Self-Service Data Provisioning through Semantic Enrichment of Data.pptx
@@ -317,11 +317,11 @@
           <c:showBubbleSize val="0"/>
         </c:dLbls>
         <c:gapWidth val="150"/>
-        <c:axId val="251688832"/>
-        <c:axId val="251690368"/>
+        <c:axId val="181477376"/>
+        <c:axId val="181478912"/>
       </c:barChart>
       <c:catAx>
-        <c:axId val="251688832"/>
+        <c:axId val="181477376"/>
         <c:scaling>
           <c:orientation val="minMax"/>
         </c:scaling>
@@ -330,7 +330,7 @@
         <c:majorTickMark val="out"/>
         <c:minorTickMark val="none"/>
         <c:tickLblPos val="nextTo"/>
-        <c:crossAx val="251690368"/>
+        <c:crossAx val="181478912"/>
         <c:crosses val="autoZero"/>
         <c:auto val="1"/>
         <c:lblAlgn val="ctr"/>
@@ -338,7 +338,7 @@
         <c:noMultiLvlLbl val="0"/>
       </c:catAx>
       <c:valAx>
-        <c:axId val="251690368"/>
+        <c:axId val="181478912"/>
         <c:scaling>
           <c:orientation val="minMax"/>
         </c:scaling>
@@ -349,7 +349,7 @@
         <c:majorTickMark val="out"/>
         <c:minorTickMark val="none"/>
         <c:tickLblPos val="nextTo"/>
-        <c:crossAx val="251688832"/>
+        <c:crossAx val="181477376"/>
         <c:crosses val="autoZero"/>
         <c:crossBetween val="between"/>
       </c:valAx>
@@ -36977,8 +36977,23 @@
                 </a:solidFill>
                 <a:latin typeface="Segoe UI Light" panose="020B0502040204020203" pitchFamily="34" charset="0"/>
               </a:rPr>
-              <a:t> that provide search interfaces on top of their data repository</a:t>
-            </a:r>
+              <a:t> that provide search interfaces on top of their data </a:t>
+            </a:r>
+            <a:r>
+              <a:rPr lang="en-US" dirty="0" smtClean="0">
+                <a:solidFill>
+                  <a:srgbClr val="000000"/>
+                </a:solidFill>
+                <a:latin typeface="Segoe UI Light" panose="020B0502040204020203" pitchFamily="34" charset="0"/>
+              </a:rPr>
+              <a:t>repository</a:t>
+            </a:r>
+            <a:endParaRPr lang="en-US" dirty="0" smtClean="0">
+              <a:solidFill>
+                <a:srgbClr val="000000"/>
+              </a:solidFill>
+              <a:latin typeface="Segoe UI Light" panose="020B0502040204020203" pitchFamily="34" charset="0"/>
+            </a:endParaRPr>
           </a:p>
           <a:p>
             <a:pPr marL="742950" lvl="1" indent="-285750">
@@ -37028,16 +37043,10 @@
               <a:t>Microsoft curates </a:t>
             </a:r>
             <a:r>
-              <a:rPr lang="en-US" dirty="0">
-                <a:latin typeface="Segoe UI Light" panose="020B0502040204020203" pitchFamily="34" charset="0"/>
-              </a:rPr>
-              <a:t>public data from limited </a:t>
-            </a:r>
-            <a:r>
               <a:rPr lang="en-US" dirty="0" smtClean="0">
                 <a:latin typeface="Segoe UI Light" panose="020B0502040204020203" pitchFamily="34" charset="0"/>
               </a:rPr>
-              <a:t>sources</a:t>
+              <a:t>public data from limited sources</a:t>
             </a:r>
           </a:p>
           <a:p>
@@ -37046,7 +37055,7 @@
               <a:buChar char="•"/>
             </a:pPr>
             <a:r>
-              <a:rPr lang="en-US" dirty="0">
+              <a:rPr lang="en-US" dirty="0" smtClean="0">
                 <a:latin typeface="Segoe UI Light" panose="020B0502040204020203" pitchFamily="34" charset="0"/>
                 <a:ea typeface="Segoe UI" panose="020B0502040204020203" pitchFamily="34" charset="0"/>
                 <a:cs typeface="Segoe UI" panose="020B0502040204020203" pitchFamily="34" charset="0"/>
@@ -37054,11 +37063,11 @@
               <a:t>A subset of</a:t>
             </a:r>
             <a:r>
-              <a:rPr lang="en-US" dirty="0"/>
+              <a:rPr lang="en-US" dirty="0" smtClean="0"/>
               <a:t> </a:t>
             </a:r>
             <a:r>
-              <a:rPr lang="en-US" dirty="0">
+              <a:rPr lang="en-US" dirty="0" smtClean="0">
                 <a:latin typeface="Segoe UI Light" panose="020B0502040204020203" pitchFamily="34" charset="0"/>
               </a:rPr>
               <a:t>Data.gov</a:t>
@@ -37070,7 +37079,7 @@
               <a:buChar char="•"/>
             </a:pPr>
             <a:r>
-              <a:rPr lang="en-US" dirty="0">
+              <a:rPr lang="en-US" dirty="0" smtClean="0">
                 <a:latin typeface="Segoe UI Light" panose="020B0502040204020203" pitchFamily="34" charset="0"/>
               </a:rPr>
               <a:t>The World Bank</a:t>
@@ -37082,7 +37091,7 @@
               <a:buChar char="•"/>
             </a:pPr>
             <a:r>
-              <a:rPr lang="en-US" dirty="0">
+              <a:rPr lang="en-US" dirty="0" smtClean="0">
                 <a:latin typeface="Segoe UI Light" panose="020B0502040204020203" pitchFamily="34" charset="0"/>
               </a:rPr>
               <a:t>HealthData.gov</a:t>
@@ -37094,16 +37103,10 @@
               <a:buChar char="•"/>
             </a:pPr>
             <a:r>
-              <a:rPr lang="en-US" dirty="0">
-                <a:latin typeface="Segoe UI Light" panose="020B0502040204020203" pitchFamily="34" charset="0"/>
-              </a:rPr>
-              <a:t>Wikipedia </a:t>
-            </a:r>
-            <a:r>
               <a:rPr lang="en-US" dirty="0" smtClean="0">
                 <a:latin typeface="Segoe UI Light" panose="020B0502040204020203" pitchFamily="34" charset="0"/>
               </a:rPr>
-              <a:t>Tables</a:t>
+              <a:t>Wikipedia Tables</a:t>
             </a:r>
             <a:endParaRPr lang="en-US" dirty="0" smtClean="0">
               <a:solidFill>
@@ -37136,8 +37139,24 @@
                 </a:solidFill>
                 <a:latin typeface="Segoe UI Light" panose="020B0502040204020203" pitchFamily="34" charset="0"/>
               </a:rPr>
-              <a:t>Self-service Data Provisioning:</a:t>
-            </a:r>
+              <a:t>Self-service Data Provisioning</a:t>
+            </a:r>
+            <a:r>
+              <a:rPr lang="en-US" dirty="0" smtClean="0">
+                <a:solidFill>
+                  <a:srgbClr val="000000"/>
+                </a:solidFill>
+                <a:latin typeface="Segoe UI Light" panose="020B0502040204020203" pitchFamily="34" charset="0"/>
+              </a:rPr>
+              <a:t>:</a:t>
+            </a:r>
+            <a:endParaRPr lang="en-US" dirty="0" smtClean="0">
+              <a:solidFill>
+                <a:srgbClr val="000000"/>
+              </a:solidFill>
+              <a:latin typeface="Segoe UI Light" panose="020B0502040204020203" pitchFamily="34" charset="0"/>
+              <a:hlinkClick r:id="rId7"/>
+            </a:endParaRPr>
           </a:p>
           <a:p>
             <a:pPr marL="742950" lvl="1" indent="-285750">
@@ -37160,16 +37179,6 @@
               <a:t> </a:t>
             </a:r>
             <a:r>
-              <a:rPr lang="en-US" dirty="0">
-                <a:solidFill>
-                  <a:srgbClr val="000000"/>
-                </a:solidFill>
-                <a:latin typeface="Segoe UI Light" panose="020B0502040204020203" pitchFamily="34" charset="0"/>
-                <a:hlinkClick r:id="rId7"/>
-              </a:rPr>
-              <a:t>Power </a:t>
-            </a:r>
-            <a:r>
               <a:rPr lang="en-US" dirty="0" smtClean="0">
                 <a:solidFill>
                   <a:srgbClr val="000000"/>
@@ -37177,7 +37186,7 @@
                 <a:latin typeface="Segoe UI Light" panose="020B0502040204020203" pitchFamily="34" charset="0"/>
                 <a:hlinkClick r:id="rId7"/>
               </a:rPr>
-              <a:t>Query</a:t>
+              <a:t>Power Query</a:t>
             </a:r>
             <a:r>
               <a:rPr lang="en-US" dirty="0" smtClean="0">
@@ -37204,19 +37213,7 @@
               <a:rPr lang="en-US" dirty="0" smtClean="0">
                 <a:latin typeface="Segoe UI Light" panose="020B0502040204020203" pitchFamily="34" charset="0"/>
               </a:rPr>
-              <a:t>Text-based sources: plain </a:t>
-            </a:r>
-            <a:r>
-              <a:rPr lang="en-US" dirty="0">
-                <a:latin typeface="Segoe UI Light" panose="020B0502040204020203" pitchFamily="34" charset="0"/>
-              </a:rPr>
-              <a:t>text, </a:t>
-            </a:r>
-            <a:r>
-              <a:rPr lang="en-US" dirty="0" smtClean="0">
-                <a:latin typeface="Segoe UI Light" panose="020B0502040204020203" pitchFamily="34" charset="0"/>
-              </a:rPr>
-              <a:t>CSV, XML, Excel files, etc.</a:t>
+              <a:t>Text-based sources: plain text, CSV, XML, Excel files, etc.</a:t>
             </a:r>
           </a:p>
           <a:p>
@@ -37228,32 +37225,11 @@
               <a:rPr lang="en-US" dirty="0" smtClean="0">
                 <a:latin typeface="Segoe UI Light" panose="020B0502040204020203" pitchFamily="34" charset="0"/>
               </a:rPr>
-              <a:t>Web-based sources: tables </a:t>
-            </a:r>
-            <a:r>
-              <a:rPr lang="en-US" dirty="0">
-                <a:latin typeface="Segoe UI Light" panose="020B0502040204020203" pitchFamily="34" charset="0"/>
-              </a:rPr>
-              <a:t>on </a:t>
-            </a:r>
-            <a:r>
-              <a:rPr lang="en-US" dirty="0" smtClean="0">
-                <a:latin typeface="Segoe UI Light" panose="020B0502040204020203" pitchFamily="34" charset="0"/>
-              </a:rPr>
-              <a:t>Web pages, Web </a:t>
-            </a:r>
-            <a:r>
-              <a:rPr lang="en-US" dirty="0">
-                <a:latin typeface="Segoe UI Light" panose="020B0502040204020203" pitchFamily="34" charset="0"/>
-              </a:rPr>
-              <a:t>APIs / </a:t>
-            </a:r>
-            <a:r>
-              <a:rPr lang="en-US" dirty="0" smtClean="0">
-                <a:latin typeface="Segoe UI Light" panose="020B0502040204020203" pitchFamily="34" charset="0"/>
-              </a:rPr>
-              <a:t>JSON and OData </a:t>
-            </a:r>
+              <a:t>Web-based sources: tables on Web pages, Web APIs / JSON and OData </a:t>
+            </a:r>
+            <a:endParaRPr lang="en-US" dirty="0" smtClean="0">
+              <a:latin typeface="Segoe UI Light" panose="020B0502040204020203" pitchFamily="34" charset="0"/>
+            </a:endParaRPr>
           </a:p>
         </p:txBody>
       </p:sp>

</xml_diff>